<commit_message>
completed documentation & presentation
</commit_message>
<xml_diff>
--- a/dokumentacija/predstavitev.pptx
+++ b/dokumentacija/predstavitev.pptx
@@ -7,6 +7,9 @@
   <p:sldIdLst>
     <p:sldId id="256" r:id="rId2"/>
     <p:sldId id="257" r:id="rId3"/>
+    <p:sldId id="258" r:id="rId4"/>
+    <p:sldId id="259" r:id="rId5"/>
+    <p:sldId id="260" r:id="rId6"/>
   </p:sldIdLst>
   <p:sldSz cx="12192000" cy="6858000"/>
   <p:notesSz cx="6858000" cy="9144000"/>
@@ -105,11 +108,16 @@
       </a:defRPr>
     </a:lvl9pPr>
   </p:defaultTextStyle>
+  <p:extLst>
+    <p:ext uri="{EFAFB233-063F-42B5-8137-9DF3F51BA10A}">
+      <p15:sldGuideLst xmlns:p15="http://schemas.microsoft.com/office/powerpoint/2012/main"/>
+    </p:ext>
+  </p:extLst>
 </p:presentation>
 </file>
 
 <file path=ppt/slideLayouts/slideLayout1.xml><?xml version="1.0" encoding="utf-8"?>
-<p:sldLayout xmlns:a="http://schemas.openxmlformats.org/drawingml/2006/main" xmlns:r="http://schemas.openxmlformats.org/officeDocument/2006/relationships" xmlns:p="http://schemas.openxmlformats.org/presentationml/2006/main" showMasterSp="0" type="title" preserve="1">
+<p:sldLayout xmlns:a="http://schemas.openxmlformats.org/drawingml/2006/main" xmlns:r="http://schemas.openxmlformats.org/officeDocument/2006/relationships" xmlns:p="http://schemas.openxmlformats.org/presentationml/2006/main" type="title" preserve="1">
   <p:cSld name="Naslovni diapozitiv">
     <p:spTree>
       <p:nvGrpSpPr>
@@ -300,7 +308,7 @@
             <a:fld id="{B61BEF0D-F0BB-DE4B-95CE-6DB70DBA9567}" type="datetimeFigureOut">
               <a:rPr lang="en-US" dirty="0"/>
               <a:pPr/>
-              <a:t>5/29/2024</a:t>
+              <a:t>5/30/2024</a:t>
             </a:fld>
             <a:endParaRPr lang="en-US" dirty="0"/>
           </a:p>
@@ -733,7 +741,7 @@
             <a:fld id="{B61BEF0D-F0BB-DE4B-95CE-6DB70DBA9567}" type="datetimeFigureOut">
               <a:rPr lang="en-US" dirty="0"/>
               <a:pPr/>
-              <a:t>5/29/2024</a:t>
+              <a:t>5/30/2024</a:t>
             </a:fld>
             <a:endParaRPr lang="en-US" dirty="0"/>
           </a:p>
@@ -980,7 +988,7 @@
             <a:fld id="{B61BEF0D-F0BB-DE4B-95CE-6DB70DBA9567}" type="datetimeFigureOut">
               <a:rPr lang="en-US" dirty="0"/>
               <a:pPr/>
-              <a:t>5/29/2024</a:t>
+              <a:t>5/30/2024</a:t>
             </a:fld>
             <a:endParaRPr lang="en-US" dirty="0"/>
           </a:p>
@@ -1285,7 +1293,7 @@
             <a:fld id="{B61BEF0D-F0BB-DE4B-95CE-6DB70DBA9567}" type="datetimeFigureOut">
               <a:rPr lang="en-US" dirty="0"/>
               <a:pPr/>
-              <a:t>5/29/2024</a:t>
+              <a:t>5/30/2024</a:t>
             </a:fld>
             <a:endParaRPr lang="en-US" dirty="0"/>
           </a:p>
@@ -1600,7 +1608,7 @@
             <a:fld id="{B61BEF0D-F0BB-DE4B-95CE-6DB70DBA9567}" type="datetimeFigureOut">
               <a:rPr lang="en-US" dirty="0"/>
               <a:pPr/>
-              <a:t>5/29/2024</a:t>
+              <a:t>5/30/2024</a:t>
             </a:fld>
             <a:endParaRPr lang="en-US" dirty="0"/>
           </a:p>
@@ -1899,7 +1907,7 @@
             <a:fld id="{B61BEF0D-F0BB-DE4B-95CE-6DB70DBA9567}" type="datetimeFigureOut">
               <a:rPr lang="en-US" dirty="0"/>
               <a:pPr/>
-              <a:t>5/29/2024</a:t>
+              <a:t>5/30/2024</a:t>
             </a:fld>
             <a:endParaRPr lang="en-US" dirty="0"/>
           </a:p>
@@ -2263,7 +2271,7 @@
             <a:fld id="{B61BEF0D-F0BB-DE4B-95CE-6DB70DBA9567}" type="datetimeFigureOut">
               <a:rPr lang="en-US" dirty="0"/>
               <a:pPr/>
-              <a:t>5/29/2024</a:t>
+              <a:t>5/30/2024</a:t>
             </a:fld>
             <a:endParaRPr lang="en-US" dirty="0"/>
           </a:p>
@@ -2434,7 +2442,7 @@
             <a:fld id="{B61BEF0D-F0BB-DE4B-95CE-6DB70DBA9567}" type="datetimeFigureOut">
               <a:rPr lang="en-US" dirty="0"/>
               <a:pPr/>
-              <a:t>5/29/2024</a:t>
+              <a:t>5/30/2024</a:t>
             </a:fld>
             <a:endParaRPr lang="en-US" dirty="0"/>
           </a:p>
@@ -2611,7 +2619,7 @@
             <a:fld id="{B61BEF0D-F0BB-DE4B-95CE-6DB70DBA9567}" type="datetimeFigureOut">
               <a:rPr lang="en-US" dirty="0"/>
               <a:pPr/>
-              <a:t>5/29/2024</a:t>
+              <a:t>5/30/2024</a:t>
             </a:fld>
             <a:endParaRPr lang="en-US" dirty="0"/>
           </a:p>
@@ -2778,7 +2786,7 @@
             <a:fld id="{B61BEF0D-F0BB-DE4B-95CE-6DB70DBA9567}" type="datetimeFigureOut">
               <a:rPr lang="en-US" dirty="0"/>
               <a:pPr/>
-              <a:t>5/29/2024</a:t>
+              <a:t>5/30/2024</a:t>
             </a:fld>
             <a:endParaRPr lang="en-US" dirty="0"/>
           </a:p>
@@ -3025,7 +3033,7 @@
             <a:fld id="{B61BEF0D-F0BB-DE4B-95CE-6DB70DBA9567}" type="datetimeFigureOut">
               <a:rPr lang="en-US" dirty="0"/>
               <a:pPr/>
-              <a:t>5/29/2024</a:t>
+              <a:t>5/30/2024</a:t>
             </a:fld>
             <a:endParaRPr lang="en-US" dirty="0"/>
           </a:p>
@@ -3258,7 +3266,7 @@
             <a:fld id="{B61BEF0D-F0BB-DE4B-95CE-6DB70DBA9567}" type="datetimeFigureOut">
               <a:rPr lang="en-US" dirty="0"/>
               <a:pPr/>
-              <a:t>5/29/2024</a:t>
+              <a:t>5/30/2024</a:t>
             </a:fld>
             <a:endParaRPr lang="en-US" dirty="0"/>
           </a:p>
@@ -3637,7 +3645,7 @@
             <a:fld id="{B61BEF0D-F0BB-DE4B-95CE-6DB70DBA9567}" type="datetimeFigureOut">
               <a:rPr lang="en-US" dirty="0"/>
               <a:pPr/>
-              <a:t>5/29/2024</a:t>
+              <a:t>5/30/2024</a:t>
             </a:fld>
             <a:endParaRPr lang="en-US" dirty="0"/>
           </a:p>
@@ -3752,7 +3760,7 @@
             <a:fld id="{B61BEF0D-F0BB-DE4B-95CE-6DB70DBA9567}" type="datetimeFigureOut">
               <a:rPr lang="en-US" dirty="0"/>
               <a:pPr/>
-              <a:t>5/29/2024</a:t>
+              <a:t>5/30/2024</a:t>
             </a:fld>
             <a:endParaRPr lang="en-US" dirty="0"/>
           </a:p>
@@ -3844,7 +3852,7 @@
             <a:fld id="{B61BEF0D-F0BB-DE4B-95CE-6DB70DBA9567}" type="datetimeFigureOut">
               <a:rPr lang="en-US" dirty="0"/>
               <a:pPr/>
-              <a:t>5/29/2024</a:t>
+              <a:t>5/30/2024</a:t>
             </a:fld>
             <a:endParaRPr lang="en-US" dirty="0"/>
           </a:p>
@@ -4096,7 +4104,7 @@
             <a:fld id="{B61BEF0D-F0BB-DE4B-95CE-6DB70DBA9567}" type="datetimeFigureOut">
               <a:rPr lang="en-US" dirty="0"/>
               <a:pPr/>
-              <a:t>5/29/2024</a:t>
+              <a:t>5/30/2024</a:t>
             </a:fld>
             <a:endParaRPr lang="en-US" dirty="0"/>
           </a:p>
@@ -4376,7 +4384,7 @@
             <a:fld id="{B61BEF0D-F0BB-DE4B-95CE-6DB70DBA9567}" type="datetimeFigureOut">
               <a:rPr lang="en-US" dirty="0"/>
               <a:pPr/>
-              <a:t>5/29/2024</a:t>
+              <a:t>5/30/2024</a:t>
             </a:fld>
             <a:endParaRPr lang="en-US" dirty="0"/>
           </a:p>
@@ -4437,9 +4445,21 @@
 <p:sldMaster xmlns:a="http://schemas.openxmlformats.org/drawingml/2006/main" xmlns:r="http://schemas.openxmlformats.org/officeDocument/2006/relationships" xmlns:p="http://schemas.openxmlformats.org/presentationml/2006/main">
   <p:cSld>
     <p:bg>
-      <p:bgRef idx="1002">
-        <a:schemeClr val="bg2"/>
-      </p:bgRef>
+      <p:bgPr>
+        <a:gradFill flip="none" rotWithShape="1">
+          <a:gsLst>
+            <a:gs pos="14000">
+              <a:srgbClr val="0070C0"/>
+            </a:gs>
+            <a:gs pos="94000">
+              <a:srgbClr val="002060"/>
+            </a:gs>
+          </a:gsLst>
+          <a:lin ang="6120000" scaled="1"/>
+          <a:tileRect/>
+        </a:gradFill>
+        <a:effectLst/>
+      </p:bgPr>
     </p:bg>
     <p:spTree>
       <p:nvGrpSpPr>
@@ -4779,7 +4799,7 @@
             <a:fld id="{B61BEF0D-F0BB-DE4B-95CE-6DB70DBA9567}" type="datetimeFigureOut">
               <a:rPr lang="en-US" dirty="0"/>
               <a:pPr/>
-              <a:t>5/29/2024</a:t>
+              <a:t>5/30/2024</a:t>
             </a:fld>
             <a:endParaRPr lang="en-US" dirty="0"/>
           </a:p>
@@ -5343,25 +5363,17 @@
               <a:rPr lang="en-GB" dirty="0" err="1"/>
               <a:t>spletne</a:t>
             </a:r>
-            <a:r>
-              <a:rPr lang="en-GB" dirty="0"/>
-              <a:t> </a:t>
-            </a:r>
-            <a:r>
-              <a:rPr lang="en-GB" dirty="0" err="1"/>
-              <a:t>strani</a:t>
-            </a:r>
-            <a:r>
-              <a:rPr lang="en-GB" dirty="0"/>
-              <a:t> </a:t>
-            </a:r>
-            <a:r>
-              <a:rPr lang="en-GB" dirty="0" err="1"/>
-              <a:t>podjetja</a:t>
-            </a:r>
             <a:br>
               <a:rPr lang="en-GB" dirty="0"/>
             </a:br>
+            <a:r>
+              <a:rPr lang="en-GB" dirty="0" err="1"/>
+              <a:t>strani</a:t>
+            </a:r>
+            <a:r>
+              <a:rPr lang="en-GB" dirty="0"/>
+              <a:t> </a:t>
+            </a:r>
             <a:r>
               <a:rPr lang="en-GB" dirty="0" err="1"/>
               <a:t>Bimo</a:t>
@@ -5419,31 +5431,6 @@
 <file path=ppt/slides/slide2.xml><?xml version="1.0" encoding="utf-8"?>
 <p:sld xmlns:a="http://schemas.openxmlformats.org/drawingml/2006/main" xmlns:r="http://schemas.openxmlformats.org/officeDocument/2006/relationships" xmlns:p="http://schemas.openxmlformats.org/presentationml/2006/main">
   <p:cSld>
-    <p:bg>
-      <p:bgPr>
-        <a:gradFill rotWithShape="1">
-          <a:gsLst>
-            <a:gs pos="10000">
-              <a:schemeClr val="bg2">
-                <a:tint val="97000"/>
-                <a:hueMod val="92000"/>
-                <a:satMod val="169000"/>
-                <a:lumMod val="164000"/>
-              </a:schemeClr>
-            </a:gs>
-            <a:gs pos="100000">
-              <a:schemeClr val="bg2">
-                <a:shade val="96000"/>
-                <a:satMod val="120000"/>
-                <a:lumMod val="90000"/>
-              </a:schemeClr>
-            </a:gs>
-          </a:gsLst>
-          <a:lin ang="6120000" scaled="1"/>
-        </a:gradFill>
-        <a:effectLst/>
-      </p:bgPr>
-    </p:bg>
     <p:spTree>
       <p:nvGrpSpPr>
         <p:cNvPr id="1" name=""/>
@@ -5828,6 +5815,26 @@
           </a:bodyPr>
           <a:lstStyle/>
           <a:p>
+            <a:r>
+              <a:rPr lang="en-US" dirty="0" err="1"/>
+              <a:t>Uporabljena</a:t>
+            </a:r>
+            <a:r>
+              <a:rPr lang="en-US" dirty="0"/>
+              <a:t> </a:t>
+            </a:r>
+            <a:r>
+              <a:rPr lang="en-US" dirty="0" err="1"/>
+              <a:t>Orodja</a:t>
+            </a:r>
+            <a:r>
+              <a:rPr lang="en-US" dirty="0"/>
+              <a:t> in </a:t>
+            </a:r>
+            <a:r>
+              <a:rPr lang="en-US" dirty="0" err="1"/>
+              <a:t>jeziki</a:t>
+            </a:r>
             <a:endParaRPr lang="en-US" dirty="0"/>
           </a:p>
         </p:txBody>
@@ -5905,64 +5912,6 @@
           </a:p>
         </p:txBody>
       </p:sp>
-      <p:pic>
-        <p:nvPicPr>
-          <p:cNvPr id="61" name="Označba mesta slike 60">
-            <a:extLst>
-              <a:ext uri="{FF2B5EF4-FFF2-40B4-BE49-F238E27FC236}">
-                <a16:creationId xmlns:a16="http://schemas.microsoft.com/office/drawing/2014/main" id="{177D7673-B7F2-0135-DDE2-0E85A66FFFEB}"/>
-              </a:ext>
-            </a:extLst>
-          </p:cNvPr>
-          <p:cNvPicPr>
-            <a:picLocks noGrp="1" noChangeAspect="1"/>
-          </p:cNvPicPr>
-          <p:nvPr>
-            <p:ph type="pic" idx="1"/>
-          </p:nvPr>
-        </p:nvPicPr>
-        <p:blipFill rotWithShape="1">
-          <a:blip r:embed="rId2"/>
-          <a:srcRect l="1444" r="26728"/>
-          <a:stretch/>
-        </p:blipFill>
-        <p:spPr>
-          <a:xfrm>
-            <a:off x="778062" y="786117"/>
-            <a:ext cx="6245352" cy="4956048"/>
-          </a:xfrm>
-          <a:custGeom>
-            <a:avLst/>
-            <a:gdLst/>
-            <a:ahLst/>
-            <a:cxnLst/>
-            <a:rect l="l" t="t" r="r" b="b"/>
-            <a:pathLst>
-              <a:path w="6245352" h="4956048">
-                <a:moveTo>
-                  <a:pt x="534609" y="0"/>
-                </a:moveTo>
-                <a:lnTo>
-                  <a:pt x="6245352" y="0"/>
-                </a:lnTo>
-                <a:lnTo>
-                  <a:pt x="6245352" y="4421439"/>
-                </a:lnTo>
-                <a:lnTo>
-                  <a:pt x="5710743" y="4956048"/>
-                </a:lnTo>
-                <a:lnTo>
-                  <a:pt x="0" y="4956048"/>
-                </a:lnTo>
-                <a:lnTo>
-                  <a:pt x="0" y="534609"/>
-                </a:lnTo>
-                <a:close/>
-              </a:path>
-            </a:pathLst>
-          </a:custGeom>
-        </p:spPr>
-      </p:pic>
       <p:sp>
         <p:nvSpPr>
           <p:cNvPr id="4" name="Označba mesta besedila 3">
@@ -5991,11 +5940,102 @@
           </a:bodyPr>
           <a:lstStyle/>
           <a:p>
-            <a:pPr>
-              <a:buFont typeface="Wingdings 3" panose="05040102010807070707" pitchFamily="18" charset="2"/>
-              <a:buChar char=""/>
+            <a:pPr marL="285750" indent="-285750">
+              <a:buFont typeface="Wingdings" panose="05000000000000000000" pitchFamily="2" charset="2"/>
+              <a:buChar char="§"/>
             </a:pPr>
-            <a:endParaRPr lang="en-US" sz="1400"/>
+            <a:r>
+              <a:rPr lang="en-US" sz="1400" dirty="0">
+                <a:solidFill>
+                  <a:schemeClr val="tx1"/>
+                </a:solidFill>
+              </a:rPr>
+              <a:t>HMTL</a:t>
+            </a:r>
+          </a:p>
+          <a:p>
+            <a:pPr marL="285750" indent="-285750">
+              <a:buFont typeface="Wingdings" panose="05000000000000000000" pitchFamily="2" charset="2"/>
+              <a:buChar char="§"/>
+            </a:pPr>
+            <a:r>
+              <a:rPr lang="en-US" sz="1400" dirty="0">
+                <a:solidFill>
+                  <a:schemeClr val="tx1"/>
+                </a:solidFill>
+              </a:rPr>
+              <a:t>CSS</a:t>
+            </a:r>
+          </a:p>
+          <a:p>
+            <a:pPr marL="285750" indent="-285750">
+              <a:buFont typeface="Wingdings" panose="05000000000000000000" pitchFamily="2" charset="2"/>
+              <a:buChar char="§"/>
+            </a:pPr>
+            <a:r>
+              <a:rPr lang="en-US" sz="1400" dirty="0">
+                <a:solidFill>
+                  <a:schemeClr val="tx1"/>
+                </a:solidFill>
+              </a:rPr>
+              <a:t>JavaScript</a:t>
+            </a:r>
+          </a:p>
+          <a:p>
+            <a:pPr marL="285750" indent="-285750">
+              <a:buFont typeface="Wingdings" panose="05000000000000000000" pitchFamily="2" charset="2"/>
+              <a:buChar char="§"/>
+            </a:pPr>
+            <a:r>
+              <a:rPr lang="en-US" sz="1400" dirty="0">
+                <a:solidFill>
+                  <a:schemeClr val="tx1"/>
+                </a:solidFill>
+              </a:rPr>
+              <a:t>Bootstrap 5</a:t>
+            </a:r>
+          </a:p>
+          <a:p>
+            <a:pPr marL="285750" indent="-285750">
+              <a:buFont typeface="Wingdings" panose="05000000000000000000" pitchFamily="2" charset="2"/>
+              <a:buChar char="§"/>
+            </a:pPr>
+            <a:r>
+              <a:rPr lang="nl-NL" sz="1400" dirty="0">
+                <a:solidFill>
+                  <a:schemeClr val="tx1"/>
+                </a:solidFill>
+              </a:rPr>
+              <a:t>Google Maps in Google Fonts API</a:t>
+            </a:r>
+          </a:p>
+          <a:p>
+            <a:pPr marL="285750" indent="-285750">
+              <a:buFont typeface="Wingdings" panose="05000000000000000000" pitchFamily="2" charset="2"/>
+              <a:buChar char="§"/>
+            </a:pPr>
+            <a:r>
+              <a:rPr lang="nl-NL" sz="1400" dirty="0">
+                <a:solidFill>
+                  <a:schemeClr val="tx1"/>
+                </a:solidFill>
+              </a:rPr>
+              <a:t>Figma</a:t>
+            </a:r>
+          </a:p>
+          <a:p>
+            <a:pPr marL="285750" indent="-285750">
+              <a:buFont typeface="Wingdings" panose="05000000000000000000" pitchFamily="2" charset="2"/>
+              <a:buChar char="§"/>
+            </a:pPr>
+            <a:r>
+              <a:rPr lang="nl-NL" sz="1400" dirty="0">
+                <a:solidFill>
+                  <a:schemeClr val="tx1"/>
+                </a:solidFill>
+              </a:rPr>
+              <a:t>000webhost</a:t>
+            </a:r>
           </a:p>
         </p:txBody>
       </p:sp>
@@ -6281,10 +6321,1663 @@
           </p:style>
         </p:cxnSp>
       </p:grpSp>
+      <p:sp>
+        <p:nvSpPr>
+          <p:cNvPr id="5" name="Označba mesta slike 4">
+            <a:extLst>
+              <a:ext uri="{FF2B5EF4-FFF2-40B4-BE49-F238E27FC236}">
+                <a16:creationId xmlns:a16="http://schemas.microsoft.com/office/drawing/2014/main" id="{6344BCC6-050C-C858-1E7C-7D53248BD032}"/>
+              </a:ext>
+            </a:extLst>
+          </p:cNvPr>
+          <p:cNvSpPr>
+            <a:spLocks noGrp="1"/>
+          </p:cNvSpPr>
+          <p:nvPr>
+            <p:ph type="pic" idx="1"/>
+          </p:nvPr>
+        </p:nvSpPr>
+        <p:spPr/>
+        <p:txBody>
+          <a:bodyPr/>
+          <a:lstStyle/>
+          <a:p>
+            <a:endParaRPr lang="sl-SI"/>
+          </a:p>
+        </p:txBody>
+      </p:sp>
+      <p:pic>
+        <p:nvPicPr>
+          <p:cNvPr id="19" name="Označba mesta slike 18" descr="Slika, ki vsebuje besede besedilo, posnetek zaslona, pisava&#10;&#10;Opis je samodejno ustvarjen">
+            <a:extLst>
+              <a:ext uri="{FF2B5EF4-FFF2-40B4-BE49-F238E27FC236}">
+                <a16:creationId xmlns:a16="http://schemas.microsoft.com/office/drawing/2014/main" id="{E60DFA88-424F-620F-AB26-76D0955FD21E}"/>
+              </a:ext>
+            </a:extLst>
+          </p:cNvPr>
+          <p:cNvPicPr>
+            <a:picLocks noChangeAspect="1"/>
+          </p:cNvPicPr>
+          <p:nvPr/>
+        </p:nvPicPr>
+        <p:blipFill rotWithShape="1">
+          <a:blip r:embed="rId2"/>
+          <a:srcRect l="12002" r="17115" b="1"/>
+          <a:stretch/>
+        </p:blipFill>
+        <p:spPr>
+          <a:xfrm>
+            <a:off x="778062" y="807043"/>
+            <a:ext cx="6245352" cy="4956048"/>
+          </a:xfrm>
+          <a:custGeom>
+            <a:avLst/>
+            <a:gdLst/>
+            <a:ahLst/>
+            <a:cxnLst/>
+            <a:rect l="l" t="t" r="r" b="b"/>
+            <a:pathLst>
+              <a:path w="6245352" h="4956048">
+                <a:moveTo>
+                  <a:pt x="534609" y="0"/>
+                </a:moveTo>
+                <a:lnTo>
+                  <a:pt x="6245352" y="0"/>
+                </a:lnTo>
+                <a:lnTo>
+                  <a:pt x="6245352" y="4421439"/>
+                </a:lnTo>
+                <a:lnTo>
+                  <a:pt x="5710743" y="4956048"/>
+                </a:lnTo>
+                <a:lnTo>
+                  <a:pt x="0" y="4956048"/>
+                </a:lnTo>
+                <a:lnTo>
+                  <a:pt x="0" y="534609"/>
+                </a:lnTo>
+                <a:close/>
+              </a:path>
+            </a:pathLst>
+          </a:custGeom>
+          <a:ln w="15875">
+            <a:solidFill>
+              <a:schemeClr val="tx1">
+                <a:alpha val="40000"/>
+              </a:schemeClr>
+            </a:solidFill>
+          </a:ln>
+          <a:effectLst>
+            <a:innerShdw blurRad="57150" dist="38100" dir="14460000">
+              <a:srgbClr val="000000">
+                <a:alpha val="70000"/>
+              </a:srgbClr>
+            </a:innerShdw>
+          </a:effectLst>
+        </p:spPr>
+      </p:pic>
     </p:spTree>
     <p:extLst>
       <p:ext uri="{BB962C8B-B14F-4D97-AF65-F5344CB8AC3E}">
         <p14:creationId xmlns:p14="http://schemas.microsoft.com/office/powerpoint/2010/main" val="4099367641"/>
+      </p:ext>
+    </p:extLst>
+  </p:cSld>
+  <p:clrMapOvr>
+    <a:masterClrMapping/>
+  </p:clrMapOvr>
+</p:sld>
+</file>
+
+<file path=ppt/slides/slide3.xml><?xml version="1.0" encoding="utf-8"?>
+<p:sld xmlns:a="http://schemas.openxmlformats.org/drawingml/2006/main" xmlns:r="http://schemas.openxmlformats.org/officeDocument/2006/relationships" xmlns:p="http://schemas.openxmlformats.org/presentationml/2006/main">
+  <p:cSld>
+    <p:spTree>
+      <p:nvGrpSpPr>
+        <p:cNvPr id="1" name=""/>
+        <p:cNvGrpSpPr/>
+        <p:nvPr/>
+      </p:nvGrpSpPr>
+      <p:grpSpPr>
+        <a:xfrm>
+          <a:off x="0" y="0"/>
+          <a:ext cx="0" cy="0"/>
+          <a:chOff x="0" y="0"/>
+          <a:chExt cx="0" cy="0"/>
+        </a:xfrm>
+      </p:grpSpPr>
+      <p:grpSp>
+        <p:nvGrpSpPr>
+          <p:cNvPr id="32" name="Group 31">
+            <a:extLst>
+              <a:ext uri="{FF2B5EF4-FFF2-40B4-BE49-F238E27FC236}">
+                <a16:creationId xmlns:a16="http://schemas.microsoft.com/office/drawing/2014/main" id="{8F1EF17D-1B70-428C-8A8A-A2C5B390E1E9}"/>
+              </a:ext>
+              <a:ext uri="{C183D7F6-B498-43B3-948B-1728B52AA6E4}">
+                <adec:decorative xmlns:adec="http://schemas.microsoft.com/office/drawing/2017/decorative" val="1"/>
+              </a:ext>
+            </a:extLst>
+          </p:cNvPr>
+          <p:cNvGrpSpPr>
+            <a:grpSpLocks noGrp="1" noUngrp="1" noRot="1" noChangeAspect="1" noMove="1" noResize="1"/>
+          </p:cNvGrpSpPr>
+          <p:nvPr>
+            <p:extLst>
+              <p:ext uri="{386F3935-93C4-4BCD-93E2-E3B085C9AB24}">
+                <p16:designElem xmlns:p16="http://schemas.microsoft.com/office/powerpoint/2015/main" val="1"/>
+              </p:ext>
+            </p:extLst>
+          </p:nvPr>
+        </p:nvGrpSpPr>
+        <p:grpSpPr>
+          <a:xfrm>
+            <a:off x="9206969" y="2963333"/>
+            <a:ext cx="2981858" cy="3208867"/>
+            <a:chOff x="9206969" y="2963333"/>
+            <a:chExt cx="2981858" cy="3208867"/>
+          </a:xfrm>
+        </p:grpSpPr>
+        <p:cxnSp>
+          <p:nvCxnSpPr>
+            <p:cNvPr id="33" name="Straight Connector 32">
+              <a:extLst>
+                <a:ext uri="{FF2B5EF4-FFF2-40B4-BE49-F238E27FC236}">
+                  <a16:creationId xmlns:a16="http://schemas.microsoft.com/office/drawing/2014/main" id="{12FAEDF3-CEC8-4BF6-8EA7-4079C471838C}"/>
+                </a:ext>
+                <a:ext uri="{C183D7F6-B498-43B3-948B-1728B52AA6E4}">
+                  <adec:decorative xmlns:adec="http://schemas.microsoft.com/office/drawing/2017/decorative" val="1"/>
+                </a:ext>
+              </a:extLst>
+            </p:cNvPr>
+            <p:cNvCxnSpPr/>
+            <p:nvPr>
+              <p:extLst>
+                <p:ext uri="{386F3935-93C4-4BCD-93E2-E3B085C9AB24}">
+                  <p16:designElem xmlns:p16="http://schemas.microsoft.com/office/powerpoint/2015/main" val="1"/>
+                </p:ext>
+              </p:extLst>
+            </p:nvPr>
+          </p:nvCxnSpPr>
+          <p:spPr>
+            <a:xfrm flipH="1">
+              <a:off x="11276012" y="2963333"/>
+              <a:ext cx="912814" cy="912812"/>
+            </a:xfrm>
+            <a:prstGeom prst="line">
+              <a:avLst/>
+            </a:prstGeom>
+            <a:ln w="9525">
+              <a:solidFill>
+                <a:schemeClr val="tx1"/>
+              </a:solidFill>
+            </a:ln>
+          </p:spPr>
+          <p:style>
+            <a:lnRef idx="2">
+              <a:schemeClr val="accent1"/>
+            </a:lnRef>
+            <a:fillRef idx="0">
+              <a:schemeClr val="accent1"/>
+            </a:fillRef>
+            <a:effectRef idx="1">
+              <a:schemeClr val="accent1"/>
+            </a:effectRef>
+            <a:fontRef idx="minor">
+              <a:schemeClr val="tx1"/>
+            </a:fontRef>
+          </p:style>
+        </p:cxnSp>
+        <p:cxnSp>
+          <p:nvCxnSpPr>
+            <p:cNvPr id="34" name="Straight Connector 33">
+              <a:extLst>
+                <a:ext uri="{FF2B5EF4-FFF2-40B4-BE49-F238E27FC236}">
+                  <a16:creationId xmlns:a16="http://schemas.microsoft.com/office/drawing/2014/main" id="{398DB8F4-CD77-4FCC-8544-ADE8B478C151}"/>
+                </a:ext>
+                <a:ext uri="{C183D7F6-B498-43B3-948B-1728B52AA6E4}">
+                  <adec:decorative xmlns:adec="http://schemas.microsoft.com/office/drawing/2017/decorative" val="1"/>
+                </a:ext>
+              </a:extLst>
+            </p:cNvPr>
+            <p:cNvCxnSpPr/>
+            <p:nvPr>
+              <p:extLst>
+                <p:ext uri="{386F3935-93C4-4BCD-93E2-E3B085C9AB24}">
+                  <p16:designElem xmlns:p16="http://schemas.microsoft.com/office/powerpoint/2015/main" val="1"/>
+                </p:ext>
+              </p:extLst>
+            </p:nvPr>
+          </p:nvCxnSpPr>
+          <p:spPr>
+            <a:xfrm flipH="1">
+              <a:off x="9206969" y="3190344"/>
+              <a:ext cx="2981857" cy="2981856"/>
+            </a:xfrm>
+            <a:prstGeom prst="line">
+              <a:avLst/>
+            </a:prstGeom>
+            <a:ln w="9525">
+              <a:solidFill>
+                <a:schemeClr val="tx1"/>
+              </a:solidFill>
+            </a:ln>
+          </p:spPr>
+          <p:style>
+            <a:lnRef idx="2">
+              <a:schemeClr val="accent1"/>
+            </a:lnRef>
+            <a:fillRef idx="0">
+              <a:schemeClr val="accent1"/>
+            </a:fillRef>
+            <a:effectRef idx="1">
+              <a:schemeClr val="accent1"/>
+            </a:effectRef>
+            <a:fontRef idx="minor">
+              <a:schemeClr val="tx1"/>
+            </a:fontRef>
+          </p:style>
+        </p:cxnSp>
+        <p:cxnSp>
+          <p:nvCxnSpPr>
+            <p:cNvPr id="35" name="Straight Connector 34">
+              <a:extLst>
+                <a:ext uri="{FF2B5EF4-FFF2-40B4-BE49-F238E27FC236}">
+                  <a16:creationId xmlns:a16="http://schemas.microsoft.com/office/drawing/2014/main" id="{22202DFE-039D-48E4-8536-FA30F2489475}"/>
+                </a:ext>
+                <a:ext uri="{C183D7F6-B498-43B3-948B-1728B52AA6E4}">
+                  <adec:decorative xmlns:adec="http://schemas.microsoft.com/office/drawing/2017/decorative" val="1"/>
+                </a:ext>
+              </a:extLst>
+            </p:cNvPr>
+            <p:cNvCxnSpPr/>
+            <p:nvPr>
+              <p:extLst>
+                <p:ext uri="{386F3935-93C4-4BCD-93E2-E3B085C9AB24}">
+                  <p16:designElem xmlns:p16="http://schemas.microsoft.com/office/powerpoint/2015/main" val="1"/>
+                </p:ext>
+              </p:extLst>
+            </p:nvPr>
+          </p:nvCxnSpPr>
+          <p:spPr>
+            <a:xfrm flipH="1">
+              <a:off x="10292292" y="3285067"/>
+              <a:ext cx="1896534" cy="1896533"/>
+            </a:xfrm>
+            <a:prstGeom prst="line">
+              <a:avLst/>
+            </a:prstGeom>
+            <a:ln w="9525">
+              <a:solidFill>
+                <a:schemeClr val="tx1"/>
+              </a:solidFill>
+            </a:ln>
+          </p:spPr>
+          <p:style>
+            <a:lnRef idx="2">
+              <a:schemeClr val="accent1"/>
+            </a:lnRef>
+            <a:fillRef idx="0">
+              <a:schemeClr val="accent1"/>
+            </a:fillRef>
+            <a:effectRef idx="1">
+              <a:schemeClr val="accent1"/>
+            </a:effectRef>
+            <a:fontRef idx="minor">
+              <a:schemeClr val="tx1"/>
+            </a:fontRef>
+          </p:style>
+        </p:cxnSp>
+        <p:cxnSp>
+          <p:nvCxnSpPr>
+            <p:cNvPr id="36" name="Straight Connector 35">
+              <a:extLst>
+                <a:ext uri="{FF2B5EF4-FFF2-40B4-BE49-F238E27FC236}">
+                  <a16:creationId xmlns:a16="http://schemas.microsoft.com/office/drawing/2014/main" id="{81F05E26-510E-4164-83C7-28E4FE9D7EA3}"/>
+                </a:ext>
+                <a:ext uri="{C183D7F6-B498-43B3-948B-1728B52AA6E4}">
+                  <adec:decorative xmlns:adec="http://schemas.microsoft.com/office/drawing/2017/decorative" val="1"/>
+                </a:ext>
+              </a:extLst>
+            </p:cNvPr>
+            <p:cNvCxnSpPr/>
+            <p:nvPr>
+              <p:extLst>
+                <p:ext uri="{386F3935-93C4-4BCD-93E2-E3B085C9AB24}">
+                  <p16:designElem xmlns:p16="http://schemas.microsoft.com/office/powerpoint/2015/main" val="1"/>
+                </p:ext>
+              </p:extLst>
+            </p:nvPr>
+          </p:nvCxnSpPr>
+          <p:spPr>
+            <a:xfrm flipH="1">
+              <a:off x="10443103" y="3131080"/>
+              <a:ext cx="1745722" cy="1745720"/>
+            </a:xfrm>
+            <a:prstGeom prst="line">
+              <a:avLst/>
+            </a:prstGeom>
+            <a:ln w="28575">
+              <a:solidFill>
+                <a:schemeClr val="tx1"/>
+              </a:solidFill>
+            </a:ln>
+          </p:spPr>
+          <p:style>
+            <a:lnRef idx="2">
+              <a:schemeClr val="accent1"/>
+            </a:lnRef>
+            <a:fillRef idx="0">
+              <a:schemeClr val="accent1"/>
+            </a:fillRef>
+            <a:effectRef idx="1">
+              <a:schemeClr val="accent1"/>
+            </a:effectRef>
+            <a:fontRef idx="minor">
+              <a:schemeClr val="tx1"/>
+            </a:fontRef>
+          </p:style>
+        </p:cxnSp>
+        <p:cxnSp>
+          <p:nvCxnSpPr>
+            <p:cNvPr id="37" name="Straight Connector 36">
+              <a:extLst>
+                <a:ext uri="{FF2B5EF4-FFF2-40B4-BE49-F238E27FC236}">
+                  <a16:creationId xmlns:a16="http://schemas.microsoft.com/office/drawing/2014/main" id="{E632161A-50D4-4D96-887A-98FC9209310C}"/>
+                </a:ext>
+                <a:ext uri="{C183D7F6-B498-43B3-948B-1728B52AA6E4}">
+                  <adec:decorative xmlns:adec="http://schemas.microsoft.com/office/drawing/2017/decorative" val="1"/>
+                </a:ext>
+              </a:extLst>
+            </p:cNvPr>
+            <p:cNvCxnSpPr/>
+            <p:nvPr>
+              <p:extLst>
+                <p:ext uri="{386F3935-93C4-4BCD-93E2-E3B085C9AB24}">
+                  <p16:designElem xmlns:p16="http://schemas.microsoft.com/office/powerpoint/2015/main" val="1"/>
+                </p:ext>
+              </p:extLst>
+            </p:nvPr>
+          </p:nvCxnSpPr>
+          <p:spPr>
+            <a:xfrm flipH="1">
+              <a:off x="10918826" y="3683001"/>
+              <a:ext cx="1270001" cy="1269999"/>
+            </a:xfrm>
+            <a:prstGeom prst="line">
+              <a:avLst/>
+            </a:prstGeom>
+            <a:ln w="28575">
+              <a:solidFill>
+                <a:schemeClr val="tx1"/>
+              </a:solidFill>
+            </a:ln>
+          </p:spPr>
+          <p:style>
+            <a:lnRef idx="2">
+              <a:schemeClr val="accent1"/>
+            </a:lnRef>
+            <a:fillRef idx="0">
+              <a:schemeClr val="accent1"/>
+            </a:fillRef>
+            <a:effectRef idx="1">
+              <a:schemeClr val="accent1"/>
+            </a:effectRef>
+            <a:fontRef idx="minor">
+              <a:schemeClr val="tx1"/>
+            </a:fontRef>
+          </p:style>
+        </p:cxnSp>
+      </p:grpSp>
+      <p:sp useBgFill="1">
+        <p:nvSpPr>
+          <p:cNvPr id="39" name="Rectangle 38">
+            <a:extLst>
+              <a:ext uri="{FF2B5EF4-FFF2-40B4-BE49-F238E27FC236}">
+                <a16:creationId xmlns:a16="http://schemas.microsoft.com/office/drawing/2014/main" id="{E09CCB3F-DBCE-4964-9E34-8C5DE80EF4B5}"/>
+              </a:ext>
+              <a:ext uri="{C183D7F6-B498-43B3-948B-1728B52AA6E4}">
+                <adec:decorative xmlns:adec="http://schemas.microsoft.com/office/drawing/2017/decorative" val="1"/>
+              </a:ext>
+            </a:extLst>
+          </p:cNvPr>
+          <p:cNvSpPr>
+            <a:spLocks noGrp="1" noRot="1" noChangeAspect="1" noMove="1" noResize="1" noEditPoints="1" noAdjustHandles="1" noChangeArrowheads="1" noChangeShapeType="1" noTextEdit="1"/>
+          </p:cNvSpPr>
+          <p:nvPr>
+            <p:extLst>
+              <p:ext uri="{386F3935-93C4-4BCD-93E2-E3B085C9AB24}">
+                <p16:designElem xmlns:p16="http://schemas.microsoft.com/office/powerpoint/2015/main" val="1"/>
+              </p:ext>
+            </p:extLst>
+          </p:nvPr>
+        </p:nvSpPr>
+        <p:spPr>
+          <a:xfrm>
+            <a:off x="0" y="0"/>
+            <a:ext cx="12192000" cy="6858000"/>
+          </a:xfrm>
+          <a:prstGeom prst="rect">
+            <a:avLst/>
+          </a:prstGeom>
+          <a:ln>
+            <a:noFill/>
+          </a:ln>
+        </p:spPr>
+        <p:style>
+          <a:lnRef idx="2">
+            <a:schemeClr val="accent1">
+              <a:shade val="50000"/>
+            </a:schemeClr>
+          </a:lnRef>
+          <a:fillRef idx="1">
+            <a:schemeClr val="accent1"/>
+          </a:fillRef>
+          <a:effectRef idx="0">
+            <a:schemeClr val="accent1"/>
+          </a:effectRef>
+          <a:fontRef idx="minor">
+            <a:schemeClr val="lt1"/>
+          </a:fontRef>
+        </p:style>
+        <p:txBody>
+          <a:bodyPr rtlCol="0" anchor="ctr"/>
+          <a:lstStyle/>
+          <a:p>
+            <a:pPr algn="ctr"/>
+            <a:endParaRPr lang="en-US"/>
+          </a:p>
+        </p:txBody>
+      </p:sp>
+      <p:sp>
+        <p:nvSpPr>
+          <p:cNvPr id="2" name="Naslov 1">
+            <a:extLst>
+              <a:ext uri="{FF2B5EF4-FFF2-40B4-BE49-F238E27FC236}">
+                <a16:creationId xmlns:a16="http://schemas.microsoft.com/office/drawing/2014/main" id="{30722C51-AA90-F379-177F-09E5C4F9ECF6}"/>
+              </a:ext>
+            </a:extLst>
+          </p:cNvPr>
+          <p:cNvSpPr>
+            <a:spLocks noGrp="1"/>
+          </p:cNvSpPr>
+          <p:nvPr>
+            <p:ph type="title"/>
+          </p:nvPr>
+        </p:nvSpPr>
+        <p:spPr>
+          <a:xfrm>
+            <a:off x="7532710" y="620722"/>
+            <a:ext cx="3518748" cy="1142462"/>
+          </a:xfrm>
+        </p:spPr>
+        <p:txBody>
+          <a:bodyPr vert="horz" lIns="91440" tIns="45720" rIns="91440" bIns="45720" rtlCol="0" anchor="b">
+            <a:normAutofit/>
+          </a:bodyPr>
+          <a:lstStyle/>
+          <a:p>
+            <a:r>
+              <a:rPr lang="en-US" dirty="0" err="1"/>
+              <a:t>Zgradba</a:t>
+            </a:r>
+            <a:endParaRPr lang="en-US" dirty="0"/>
+          </a:p>
+        </p:txBody>
+      </p:sp>
+      <p:sp>
+        <p:nvSpPr>
+          <p:cNvPr id="41" name="Snip Diagonal Corner Rectangle 24">
+            <a:extLst>
+              <a:ext uri="{FF2B5EF4-FFF2-40B4-BE49-F238E27FC236}">
+                <a16:creationId xmlns:a16="http://schemas.microsoft.com/office/drawing/2014/main" id="{1DFF944F-74BA-483A-82C0-64E3AAF4AE98}"/>
+              </a:ext>
+              <a:ext uri="{C183D7F6-B498-43B3-948B-1728B52AA6E4}">
+                <adec:decorative xmlns:adec="http://schemas.microsoft.com/office/drawing/2017/decorative" val="1"/>
+              </a:ext>
+            </a:extLst>
+          </p:cNvPr>
+          <p:cNvSpPr>
+            <a:spLocks noGrp="1" noRot="1" noChangeAspect="1" noMove="1" noResize="1" noEditPoints="1" noAdjustHandles="1" noChangeArrowheads="1" noChangeShapeType="1" noTextEdit="1"/>
+          </p:cNvSpPr>
+          <p:nvPr>
+            <p:extLst>
+              <p:ext uri="{386F3935-93C4-4BCD-93E2-E3B085C9AB24}">
+                <p16:designElem xmlns:p16="http://schemas.microsoft.com/office/powerpoint/2015/main" val="1"/>
+              </p:ext>
+            </p:extLst>
+          </p:nvPr>
+        </p:nvSpPr>
+        <p:spPr>
+          <a:xfrm>
+            <a:off x="612990" y="620722"/>
+            <a:ext cx="6575496" cy="5286838"/>
+          </a:xfrm>
+          <a:prstGeom prst="snip2DiagRect">
+            <a:avLst>
+              <a:gd name="adj1" fmla="val 10787"/>
+              <a:gd name="adj2" fmla="val 0"/>
+            </a:avLst>
+          </a:prstGeom>
+          <a:solidFill>
+            <a:schemeClr val="tx1"/>
+          </a:solidFill>
+          <a:ln>
+            <a:noFill/>
+          </a:ln>
+          <a:effectLst>
+            <a:innerShdw blurRad="57150" dist="38100" dir="14460000">
+              <a:prstClr val="black">
+                <a:alpha val="70000"/>
+              </a:prstClr>
+            </a:innerShdw>
+          </a:effectLst>
+        </p:spPr>
+        <p:style>
+          <a:lnRef idx="2">
+            <a:schemeClr val="accent1">
+              <a:shade val="50000"/>
+            </a:schemeClr>
+          </a:lnRef>
+          <a:fillRef idx="1">
+            <a:schemeClr val="accent1"/>
+          </a:fillRef>
+          <a:effectRef idx="0">
+            <a:schemeClr val="accent1"/>
+          </a:effectRef>
+          <a:fontRef idx="minor">
+            <a:schemeClr val="lt1"/>
+          </a:fontRef>
+        </p:style>
+        <p:txBody>
+          <a:bodyPr rtlCol="0" anchor="ctr"/>
+          <a:lstStyle/>
+          <a:p>
+            <a:pPr algn="ctr"/>
+            <a:endParaRPr lang="en-US"/>
+          </a:p>
+        </p:txBody>
+      </p:sp>
+      <p:sp>
+        <p:nvSpPr>
+          <p:cNvPr id="4" name="Označba mesta besedila 3">
+            <a:extLst>
+              <a:ext uri="{FF2B5EF4-FFF2-40B4-BE49-F238E27FC236}">
+                <a16:creationId xmlns:a16="http://schemas.microsoft.com/office/drawing/2014/main" id="{90809AC8-1CB8-5F31-5D64-5A1D64B21623}"/>
+              </a:ext>
+            </a:extLst>
+          </p:cNvPr>
+          <p:cNvSpPr>
+            <a:spLocks noGrp="1"/>
+          </p:cNvSpPr>
+          <p:nvPr>
+            <p:ph type="body" sz="half" idx="2"/>
+          </p:nvPr>
+        </p:nvSpPr>
+        <p:spPr>
+          <a:xfrm>
+            <a:off x="7532710" y="1822449"/>
+            <a:ext cx="3479419" cy="3070226"/>
+          </a:xfrm>
+        </p:spPr>
+        <p:txBody>
+          <a:bodyPr vert="horz" lIns="91440" tIns="45720" rIns="91440" bIns="45720" rtlCol="0" anchor="t">
+            <a:normAutofit/>
+          </a:bodyPr>
+          <a:lstStyle/>
+          <a:p>
+            <a:pPr marL="342900" indent="-342900">
+              <a:buFont typeface="+mj-lt"/>
+              <a:buAutoNum type="arabicPeriod"/>
+            </a:pPr>
+            <a:r>
+              <a:rPr lang="en-US" sz="1400" dirty="0">
+                <a:solidFill>
+                  <a:schemeClr val="tx1"/>
+                </a:solidFill>
+              </a:rPr>
+              <a:t>Index (</a:t>
+            </a:r>
+            <a:r>
+              <a:rPr lang="en-US" sz="1400" dirty="0" err="1">
+                <a:solidFill>
+                  <a:schemeClr val="tx1"/>
+                </a:solidFill>
+              </a:rPr>
+              <a:t>Domača</a:t>
+            </a:r>
+            <a:r>
+              <a:rPr lang="en-US" sz="1400" dirty="0">
+                <a:solidFill>
+                  <a:schemeClr val="tx1"/>
+                </a:solidFill>
+              </a:rPr>
+              <a:t> </a:t>
+            </a:r>
+            <a:r>
+              <a:rPr lang="en-US" sz="1400" dirty="0" err="1">
+                <a:solidFill>
+                  <a:schemeClr val="tx1"/>
+                </a:solidFill>
+              </a:rPr>
+              <a:t>stran</a:t>
+            </a:r>
+            <a:r>
+              <a:rPr lang="en-US" sz="1400" dirty="0">
+                <a:solidFill>
+                  <a:schemeClr val="tx1"/>
+                </a:solidFill>
+              </a:rPr>
+              <a:t>)</a:t>
+            </a:r>
+          </a:p>
+          <a:p>
+            <a:pPr marL="342900" indent="-342900">
+              <a:buFont typeface="+mj-lt"/>
+              <a:buAutoNum type="arabicPeriod"/>
+            </a:pPr>
+            <a:r>
+              <a:rPr lang="en-US" sz="1400" dirty="0">
+                <a:solidFill>
+                  <a:schemeClr val="tx1"/>
+                </a:solidFill>
+              </a:rPr>
+              <a:t>About (O </a:t>
+            </a:r>
+            <a:r>
+              <a:rPr lang="en-US" sz="1400" dirty="0" err="1">
+                <a:solidFill>
+                  <a:schemeClr val="tx1"/>
+                </a:solidFill>
+              </a:rPr>
+              <a:t>podjetju</a:t>
+            </a:r>
+            <a:r>
+              <a:rPr lang="en-US" sz="1400" dirty="0">
+                <a:solidFill>
+                  <a:schemeClr val="tx1"/>
+                </a:solidFill>
+              </a:rPr>
+              <a:t>)</a:t>
+            </a:r>
+          </a:p>
+          <a:p>
+            <a:pPr marL="342900" indent="-342900">
+              <a:buFont typeface="+mj-lt"/>
+              <a:buAutoNum type="arabicPeriod"/>
+            </a:pPr>
+            <a:r>
+              <a:rPr lang="en-US" sz="1400" dirty="0">
+                <a:solidFill>
+                  <a:schemeClr val="tx1"/>
+                </a:solidFill>
+              </a:rPr>
+              <a:t>Cooperate (</a:t>
+            </a:r>
+            <a:r>
+              <a:rPr lang="en-US" sz="1400" dirty="0" err="1">
+                <a:solidFill>
+                  <a:schemeClr val="tx1"/>
+                </a:solidFill>
+              </a:rPr>
+              <a:t>Sodelovanje</a:t>
+            </a:r>
+            <a:r>
+              <a:rPr lang="en-US" sz="1400" dirty="0">
+                <a:solidFill>
+                  <a:schemeClr val="tx1"/>
+                </a:solidFill>
+              </a:rPr>
+              <a:t>)</a:t>
+            </a:r>
+          </a:p>
+          <a:p>
+            <a:pPr marL="342900" indent="-342900">
+              <a:buFont typeface="+mj-lt"/>
+              <a:buAutoNum type="arabicPeriod"/>
+            </a:pPr>
+            <a:r>
+              <a:rPr lang="en-US" sz="1400" dirty="0">
+                <a:solidFill>
+                  <a:schemeClr val="tx1"/>
+                </a:solidFill>
+              </a:rPr>
+              <a:t>Team (</a:t>
+            </a:r>
+            <a:r>
+              <a:rPr lang="en-US" sz="1400" dirty="0" err="1">
+                <a:solidFill>
+                  <a:schemeClr val="tx1"/>
+                </a:solidFill>
+              </a:rPr>
+              <a:t>Ekipa</a:t>
+            </a:r>
+            <a:r>
+              <a:rPr lang="en-US" sz="1400" dirty="0">
+                <a:solidFill>
+                  <a:schemeClr val="tx1"/>
+                </a:solidFill>
+              </a:rPr>
+              <a:t>)</a:t>
+            </a:r>
+          </a:p>
+          <a:p>
+            <a:pPr marL="342900" indent="-342900">
+              <a:buFont typeface="+mj-lt"/>
+              <a:buAutoNum type="arabicPeriod"/>
+            </a:pPr>
+            <a:r>
+              <a:rPr lang="en-US" sz="1400" dirty="0">
+                <a:solidFill>
+                  <a:schemeClr val="tx1"/>
+                </a:solidFill>
+              </a:rPr>
+              <a:t>Contact (</a:t>
+            </a:r>
+            <a:r>
+              <a:rPr lang="en-US" sz="1400" dirty="0" err="1">
+                <a:solidFill>
+                  <a:schemeClr val="tx1"/>
+                </a:solidFill>
+              </a:rPr>
+              <a:t>Kontakt</a:t>
+            </a:r>
+            <a:r>
+              <a:rPr lang="en-US" sz="1400" dirty="0">
+                <a:solidFill>
+                  <a:schemeClr val="tx1"/>
+                </a:solidFill>
+              </a:rPr>
+              <a:t>)</a:t>
+            </a:r>
+          </a:p>
+          <a:p>
+            <a:pPr marL="342900" indent="-342900">
+              <a:buFont typeface="+mj-lt"/>
+              <a:buAutoNum type="arabicPeriod"/>
+            </a:pPr>
+            <a:r>
+              <a:rPr lang="en-US" sz="1400" dirty="0">
+                <a:solidFill>
+                  <a:schemeClr val="tx1"/>
+                </a:solidFill>
+              </a:rPr>
+              <a:t>Partners (</a:t>
+            </a:r>
+            <a:r>
+              <a:rPr lang="en-US" sz="1400" dirty="0" err="1">
+                <a:solidFill>
+                  <a:schemeClr val="tx1"/>
+                </a:solidFill>
+              </a:rPr>
+              <a:t>Partnerji</a:t>
+            </a:r>
+            <a:r>
+              <a:rPr lang="en-US" sz="1400" dirty="0">
+                <a:solidFill>
+                  <a:schemeClr val="tx1"/>
+                </a:solidFill>
+              </a:rPr>
+              <a:t>)</a:t>
+            </a:r>
+          </a:p>
+          <a:p>
+            <a:pPr marL="342900" indent="-342900">
+              <a:buFont typeface="+mj-lt"/>
+              <a:buAutoNum type="arabicPeriod"/>
+            </a:pPr>
+            <a:r>
+              <a:rPr lang="en-US" sz="1400" dirty="0">
+                <a:solidFill>
+                  <a:schemeClr val="tx1"/>
+                </a:solidFill>
+              </a:rPr>
+              <a:t>Testimonials (</a:t>
+            </a:r>
+            <a:r>
+              <a:rPr lang="en-US" sz="1400" dirty="0" err="1">
+                <a:solidFill>
+                  <a:schemeClr val="tx1"/>
+                </a:solidFill>
+              </a:rPr>
+              <a:t>Mnenja</a:t>
+            </a:r>
+            <a:r>
+              <a:rPr lang="en-US" sz="1400" dirty="0">
+                <a:solidFill>
+                  <a:schemeClr val="tx1"/>
+                </a:solidFill>
+              </a:rPr>
+              <a:t> in </a:t>
+            </a:r>
+            <a:r>
+              <a:rPr lang="en-US" sz="1400" dirty="0" err="1">
+                <a:solidFill>
+                  <a:schemeClr val="tx1"/>
+                </a:solidFill>
+              </a:rPr>
+              <a:t>Izkušnje</a:t>
+            </a:r>
+            <a:r>
+              <a:rPr lang="en-US" sz="1400" dirty="0">
+                <a:solidFill>
+                  <a:schemeClr val="tx1"/>
+                </a:solidFill>
+              </a:rPr>
+              <a:t> </a:t>
+            </a:r>
+            <a:r>
+              <a:rPr lang="en-US" sz="1400" dirty="0" err="1">
+                <a:solidFill>
+                  <a:schemeClr val="tx1"/>
+                </a:solidFill>
+              </a:rPr>
+              <a:t>Strank</a:t>
+            </a:r>
+            <a:r>
+              <a:rPr lang="en-US" sz="1400" dirty="0">
+                <a:solidFill>
+                  <a:schemeClr val="tx1"/>
+                </a:solidFill>
+              </a:rPr>
+              <a:t>)</a:t>
+            </a:r>
+          </a:p>
+          <a:p>
+            <a:pPr marL="342900" indent="-342900">
+              <a:buFont typeface="+mj-lt"/>
+              <a:buAutoNum type="arabicPeriod"/>
+            </a:pPr>
+            <a:r>
+              <a:rPr lang="en-US" sz="1400" dirty="0">
+                <a:solidFill>
+                  <a:schemeClr val="tx1"/>
+                </a:solidFill>
+              </a:rPr>
+              <a:t>Gallery (</a:t>
+            </a:r>
+            <a:r>
+              <a:rPr lang="en-US" sz="1400" dirty="0" err="1">
+                <a:solidFill>
+                  <a:schemeClr val="tx1"/>
+                </a:solidFill>
+              </a:rPr>
+              <a:t>Galerija</a:t>
+            </a:r>
+            <a:r>
+              <a:rPr lang="en-US" sz="1400" dirty="0">
+                <a:solidFill>
+                  <a:schemeClr val="tx1"/>
+                </a:solidFill>
+              </a:rPr>
+              <a:t>)</a:t>
+            </a:r>
+          </a:p>
+          <a:p>
+            <a:pPr marL="342900" indent="-342900">
+              <a:buFont typeface="+mj-lt"/>
+              <a:buAutoNum type="arabicPeriod"/>
+            </a:pPr>
+            <a:endParaRPr lang="en-US" sz="1400" dirty="0">
+              <a:solidFill>
+                <a:schemeClr val="tx1"/>
+              </a:solidFill>
+            </a:endParaRPr>
+          </a:p>
+        </p:txBody>
+      </p:sp>
+      <p:grpSp>
+        <p:nvGrpSpPr>
+          <p:cNvPr id="43" name="Group 42">
+            <a:extLst>
+              <a:ext uri="{FF2B5EF4-FFF2-40B4-BE49-F238E27FC236}">
+                <a16:creationId xmlns:a16="http://schemas.microsoft.com/office/drawing/2014/main" id="{A9733A91-F958-4629-801A-3F6F1E09AD64}"/>
+              </a:ext>
+              <a:ext uri="{C183D7F6-B498-43B3-948B-1728B52AA6E4}">
+                <adec:decorative xmlns:adec="http://schemas.microsoft.com/office/drawing/2017/decorative" val="1"/>
+              </a:ext>
+            </a:extLst>
+          </p:cNvPr>
+          <p:cNvGrpSpPr>
+            <a:grpSpLocks noGrp="1" noUngrp="1" noRot="1" noChangeAspect="1" noMove="1" noResize="1"/>
+          </p:cNvGrpSpPr>
+          <p:nvPr>
+            <p:extLst>
+              <p:ext uri="{386F3935-93C4-4BCD-93E2-E3B085C9AB24}">
+                <p16:designElem xmlns:p16="http://schemas.microsoft.com/office/powerpoint/2015/main" val="1"/>
+              </p:ext>
+            </p:extLst>
+          </p:nvPr>
+        </p:nvGrpSpPr>
+        <p:grpSpPr>
+          <a:xfrm>
+            <a:off x="9206969" y="2963333"/>
+            <a:ext cx="2981858" cy="3208867"/>
+            <a:chOff x="9206969" y="2963333"/>
+            <a:chExt cx="2981858" cy="3208867"/>
+          </a:xfrm>
+        </p:grpSpPr>
+        <p:cxnSp>
+          <p:nvCxnSpPr>
+            <p:cNvPr id="44" name="Straight Connector 43">
+              <a:extLst>
+                <a:ext uri="{FF2B5EF4-FFF2-40B4-BE49-F238E27FC236}">
+                  <a16:creationId xmlns:a16="http://schemas.microsoft.com/office/drawing/2014/main" id="{F3812972-C68B-4C59-B3A7-4AF61E935D4A}"/>
+                </a:ext>
+                <a:ext uri="{C183D7F6-B498-43B3-948B-1728B52AA6E4}">
+                  <adec:decorative xmlns:adec="http://schemas.microsoft.com/office/drawing/2017/decorative" val="1"/>
+                </a:ext>
+              </a:extLst>
+            </p:cNvPr>
+            <p:cNvCxnSpPr/>
+            <p:nvPr>
+              <p:extLst>
+                <p:ext uri="{386F3935-93C4-4BCD-93E2-E3B085C9AB24}">
+                  <p16:designElem xmlns:p16="http://schemas.microsoft.com/office/powerpoint/2015/main" val="1"/>
+                </p:ext>
+              </p:extLst>
+            </p:nvPr>
+          </p:nvCxnSpPr>
+          <p:spPr>
+            <a:xfrm flipH="1">
+              <a:off x="11276012" y="2963333"/>
+              <a:ext cx="912814" cy="912812"/>
+            </a:xfrm>
+            <a:prstGeom prst="line">
+              <a:avLst/>
+            </a:prstGeom>
+            <a:ln w="9525">
+              <a:solidFill>
+                <a:schemeClr val="tx1"/>
+              </a:solidFill>
+            </a:ln>
+          </p:spPr>
+          <p:style>
+            <a:lnRef idx="2">
+              <a:schemeClr val="accent1"/>
+            </a:lnRef>
+            <a:fillRef idx="0">
+              <a:schemeClr val="accent1"/>
+            </a:fillRef>
+            <a:effectRef idx="1">
+              <a:schemeClr val="accent1"/>
+            </a:effectRef>
+            <a:fontRef idx="minor">
+              <a:schemeClr val="tx1"/>
+            </a:fontRef>
+          </p:style>
+        </p:cxnSp>
+        <p:cxnSp>
+          <p:nvCxnSpPr>
+            <p:cNvPr id="45" name="Straight Connector 44">
+              <a:extLst>
+                <a:ext uri="{FF2B5EF4-FFF2-40B4-BE49-F238E27FC236}">
+                  <a16:creationId xmlns:a16="http://schemas.microsoft.com/office/drawing/2014/main" id="{CB3F3B7C-7909-4486-AA08-5C6B625C3A0A}"/>
+                </a:ext>
+                <a:ext uri="{C183D7F6-B498-43B3-948B-1728B52AA6E4}">
+                  <adec:decorative xmlns:adec="http://schemas.microsoft.com/office/drawing/2017/decorative" val="1"/>
+                </a:ext>
+              </a:extLst>
+            </p:cNvPr>
+            <p:cNvCxnSpPr/>
+            <p:nvPr>
+              <p:extLst>
+                <p:ext uri="{386F3935-93C4-4BCD-93E2-E3B085C9AB24}">
+                  <p16:designElem xmlns:p16="http://schemas.microsoft.com/office/powerpoint/2015/main" val="1"/>
+                </p:ext>
+              </p:extLst>
+            </p:nvPr>
+          </p:nvCxnSpPr>
+          <p:spPr>
+            <a:xfrm flipH="1">
+              <a:off x="9206969" y="3190344"/>
+              <a:ext cx="2981857" cy="2981856"/>
+            </a:xfrm>
+            <a:prstGeom prst="line">
+              <a:avLst/>
+            </a:prstGeom>
+            <a:ln w="9525">
+              <a:solidFill>
+                <a:schemeClr val="tx1"/>
+              </a:solidFill>
+            </a:ln>
+          </p:spPr>
+          <p:style>
+            <a:lnRef idx="2">
+              <a:schemeClr val="accent1"/>
+            </a:lnRef>
+            <a:fillRef idx="0">
+              <a:schemeClr val="accent1"/>
+            </a:fillRef>
+            <a:effectRef idx="1">
+              <a:schemeClr val="accent1"/>
+            </a:effectRef>
+            <a:fontRef idx="minor">
+              <a:schemeClr val="tx1"/>
+            </a:fontRef>
+          </p:style>
+        </p:cxnSp>
+        <p:cxnSp>
+          <p:nvCxnSpPr>
+            <p:cNvPr id="46" name="Straight Connector 45">
+              <a:extLst>
+                <a:ext uri="{FF2B5EF4-FFF2-40B4-BE49-F238E27FC236}">
+                  <a16:creationId xmlns:a16="http://schemas.microsoft.com/office/drawing/2014/main" id="{00BD7DA8-741F-4296-9363-05EF91541119}"/>
+                </a:ext>
+                <a:ext uri="{C183D7F6-B498-43B3-948B-1728B52AA6E4}">
+                  <adec:decorative xmlns:adec="http://schemas.microsoft.com/office/drawing/2017/decorative" val="1"/>
+                </a:ext>
+              </a:extLst>
+            </p:cNvPr>
+            <p:cNvCxnSpPr/>
+            <p:nvPr>
+              <p:extLst>
+                <p:ext uri="{386F3935-93C4-4BCD-93E2-E3B085C9AB24}">
+                  <p16:designElem xmlns:p16="http://schemas.microsoft.com/office/powerpoint/2015/main" val="1"/>
+                </p:ext>
+              </p:extLst>
+            </p:nvPr>
+          </p:nvCxnSpPr>
+          <p:spPr>
+            <a:xfrm flipH="1">
+              <a:off x="10292292" y="3285067"/>
+              <a:ext cx="1896534" cy="1896533"/>
+            </a:xfrm>
+            <a:prstGeom prst="line">
+              <a:avLst/>
+            </a:prstGeom>
+            <a:ln w="9525">
+              <a:solidFill>
+                <a:schemeClr val="tx1"/>
+              </a:solidFill>
+            </a:ln>
+          </p:spPr>
+          <p:style>
+            <a:lnRef idx="2">
+              <a:schemeClr val="accent1"/>
+            </a:lnRef>
+            <a:fillRef idx="0">
+              <a:schemeClr val="accent1"/>
+            </a:fillRef>
+            <a:effectRef idx="1">
+              <a:schemeClr val="accent1"/>
+            </a:effectRef>
+            <a:fontRef idx="minor">
+              <a:schemeClr val="tx1"/>
+            </a:fontRef>
+          </p:style>
+        </p:cxnSp>
+        <p:cxnSp>
+          <p:nvCxnSpPr>
+            <p:cNvPr id="47" name="Straight Connector 46">
+              <a:extLst>
+                <a:ext uri="{FF2B5EF4-FFF2-40B4-BE49-F238E27FC236}">
+                  <a16:creationId xmlns:a16="http://schemas.microsoft.com/office/drawing/2014/main" id="{62068EFC-20FC-456F-839F-4BCFFCAA8197}"/>
+                </a:ext>
+                <a:ext uri="{C183D7F6-B498-43B3-948B-1728B52AA6E4}">
+                  <adec:decorative xmlns:adec="http://schemas.microsoft.com/office/drawing/2017/decorative" val="1"/>
+                </a:ext>
+              </a:extLst>
+            </p:cNvPr>
+            <p:cNvCxnSpPr/>
+            <p:nvPr>
+              <p:extLst>
+                <p:ext uri="{386F3935-93C4-4BCD-93E2-E3B085C9AB24}">
+                  <p16:designElem xmlns:p16="http://schemas.microsoft.com/office/powerpoint/2015/main" val="1"/>
+                </p:ext>
+              </p:extLst>
+            </p:nvPr>
+          </p:nvCxnSpPr>
+          <p:spPr>
+            <a:xfrm flipH="1">
+              <a:off x="10443103" y="3131080"/>
+              <a:ext cx="1745722" cy="1745720"/>
+            </a:xfrm>
+            <a:prstGeom prst="line">
+              <a:avLst/>
+            </a:prstGeom>
+            <a:ln w="28575">
+              <a:solidFill>
+                <a:schemeClr val="tx1"/>
+              </a:solidFill>
+            </a:ln>
+          </p:spPr>
+          <p:style>
+            <a:lnRef idx="2">
+              <a:schemeClr val="accent1"/>
+            </a:lnRef>
+            <a:fillRef idx="0">
+              <a:schemeClr val="accent1"/>
+            </a:fillRef>
+            <a:effectRef idx="1">
+              <a:schemeClr val="accent1"/>
+            </a:effectRef>
+            <a:fontRef idx="minor">
+              <a:schemeClr val="tx1"/>
+            </a:fontRef>
+          </p:style>
+        </p:cxnSp>
+        <p:cxnSp>
+          <p:nvCxnSpPr>
+            <p:cNvPr id="48" name="Straight Connector 47">
+              <a:extLst>
+                <a:ext uri="{FF2B5EF4-FFF2-40B4-BE49-F238E27FC236}">
+                  <a16:creationId xmlns:a16="http://schemas.microsoft.com/office/drawing/2014/main" id="{3251C60F-B911-433E-BF75-3BBEFD0538CB}"/>
+                </a:ext>
+                <a:ext uri="{C183D7F6-B498-43B3-948B-1728B52AA6E4}">
+                  <adec:decorative xmlns:adec="http://schemas.microsoft.com/office/drawing/2017/decorative" val="1"/>
+                </a:ext>
+              </a:extLst>
+            </p:cNvPr>
+            <p:cNvCxnSpPr/>
+            <p:nvPr>
+              <p:extLst>
+                <p:ext uri="{386F3935-93C4-4BCD-93E2-E3B085C9AB24}">
+                  <p16:designElem xmlns:p16="http://schemas.microsoft.com/office/powerpoint/2015/main" val="1"/>
+                </p:ext>
+              </p:extLst>
+            </p:nvPr>
+          </p:nvCxnSpPr>
+          <p:spPr>
+            <a:xfrm flipH="1">
+              <a:off x="10918826" y="3683001"/>
+              <a:ext cx="1270001" cy="1269999"/>
+            </a:xfrm>
+            <a:prstGeom prst="line">
+              <a:avLst/>
+            </a:prstGeom>
+            <a:ln w="28575">
+              <a:solidFill>
+                <a:schemeClr val="tx1"/>
+              </a:solidFill>
+            </a:ln>
+          </p:spPr>
+          <p:style>
+            <a:lnRef idx="2">
+              <a:schemeClr val="accent1"/>
+            </a:lnRef>
+            <a:fillRef idx="0">
+              <a:schemeClr val="accent1"/>
+            </a:fillRef>
+            <a:effectRef idx="1">
+              <a:schemeClr val="accent1"/>
+            </a:effectRef>
+            <a:fontRef idx="minor">
+              <a:schemeClr val="tx1"/>
+            </a:fontRef>
+          </p:style>
+        </p:cxnSp>
+      </p:grpSp>
+      <p:pic>
+        <p:nvPicPr>
+          <p:cNvPr id="61" name="Označba mesta slike 60">
+            <a:extLst>
+              <a:ext uri="{FF2B5EF4-FFF2-40B4-BE49-F238E27FC236}">
+                <a16:creationId xmlns:a16="http://schemas.microsoft.com/office/drawing/2014/main" id="{177D7673-B7F2-0135-DDE2-0E85A66FFFEB}"/>
+              </a:ext>
+            </a:extLst>
+          </p:cNvPr>
+          <p:cNvPicPr>
+            <a:picLocks noChangeAspect="1"/>
+          </p:cNvPicPr>
+          <p:nvPr/>
+        </p:nvPicPr>
+        <p:blipFill rotWithShape="1">
+          <a:blip r:embed="rId2"/>
+          <a:srcRect l="1444" r="26728"/>
+          <a:stretch/>
+        </p:blipFill>
+        <p:spPr>
+          <a:xfrm>
+            <a:off x="778062" y="786117"/>
+            <a:ext cx="6245352" cy="4956048"/>
+          </a:xfrm>
+          <a:custGeom>
+            <a:avLst/>
+            <a:gdLst/>
+            <a:ahLst/>
+            <a:cxnLst/>
+            <a:rect l="l" t="t" r="r" b="b"/>
+            <a:pathLst>
+              <a:path w="6245352" h="4956048">
+                <a:moveTo>
+                  <a:pt x="534609" y="0"/>
+                </a:moveTo>
+                <a:lnTo>
+                  <a:pt x="6245352" y="0"/>
+                </a:lnTo>
+                <a:lnTo>
+                  <a:pt x="6245352" y="4421439"/>
+                </a:lnTo>
+                <a:lnTo>
+                  <a:pt x="5710743" y="4956048"/>
+                </a:lnTo>
+                <a:lnTo>
+                  <a:pt x="0" y="4956048"/>
+                </a:lnTo>
+                <a:lnTo>
+                  <a:pt x="0" y="534609"/>
+                </a:lnTo>
+                <a:close/>
+              </a:path>
+            </a:pathLst>
+          </a:custGeom>
+          <a:ln w="15875">
+            <a:solidFill>
+              <a:schemeClr val="tx1">
+                <a:alpha val="40000"/>
+              </a:schemeClr>
+            </a:solidFill>
+          </a:ln>
+          <a:effectLst>
+            <a:innerShdw blurRad="57150" dist="38100" dir="14460000">
+              <a:srgbClr val="000000">
+                <a:alpha val="70000"/>
+              </a:srgbClr>
+            </a:innerShdw>
+          </a:effectLst>
+        </p:spPr>
+      </p:pic>
+    </p:spTree>
+    <p:extLst>
+      <p:ext uri="{BB962C8B-B14F-4D97-AF65-F5344CB8AC3E}">
+        <p14:creationId xmlns:p14="http://schemas.microsoft.com/office/powerpoint/2010/main" val="673251678"/>
+      </p:ext>
+    </p:extLst>
+  </p:cSld>
+  <p:clrMapOvr>
+    <a:masterClrMapping/>
+  </p:clrMapOvr>
+</p:sld>
+</file>
+
+<file path=ppt/slides/slide4.xml><?xml version="1.0" encoding="utf-8"?>
+<p:sld xmlns:a="http://schemas.openxmlformats.org/drawingml/2006/main" xmlns:r="http://schemas.openxmlformats.org/officeDocument/2006/relationships" xmlns:p="http://schemas.openxmlformats.org/presentationml/2006/main">
+  <p:cSld>
+    <p:spTree>
+      <p:nvGrpSpPr>
+        <p:cNvPr id="1" name=""/>
+        <p:cNvGrpSpPr/>
+        <p:nvPr/>
+      </p:nvGrpSpPr>
+      <p:grpSpPr>
+        <a:xfrm>
+          <a:off x="0" y="0"/>
+          <a:ext cx="0" cy="0"/>
+          <a:chOff x="0" y="0"/>
+          <a:chExt cx="0" cy="0"/>
+        </a:xfrm>
+      </p:grpSpPr>
+      <p:sp useBgFill="1">
+        <p:nvSpPr>
+          <p:cNvPr id="11" name="Rectangle 6">
+            <a:extLst>
+              <a:ext uri="{FF2B5EF4-FFF2-40B4-BE49-F238E27FC236}">
+                <a16:creationId xmlns:a16="http://schemas.microsoft.com/office/drawing/2014/main" id="{43F8250A-B5BC-48E8-9E34-320C6AB61351}"/>
+              </a:ext>
+              <a:ext uri="{C183D7F6-B498-43B3-948B-1728B52AA6E4}">
+                <adec:decorative xmlns:adec="http://schemas.microsoft.com/office/drawing/2017/decorative" val="1"/>
+              </a:ext>
+            </a:extLst>
+          </p:cNvPr>
+          <p:cNvSpPr>
+            <a:spLocks noGrp="1" noRot="1" noChangeAspect="1" noMove="1" noResize="1" noEditPoints="1" noAdjustHandles="1" noChangeArrowheads="1" noChangeShapeType="1" noTextEdit="1"/>
+          </p:cNvSpPr>
+          <p:nvPr>
+            <p:extLst>
+              <p:ext uri="{386F3935-93C4-4BCD-93E2-E3B085C9AB24}">
+                <p16:designElem xmlns:p16="http://schemas.microsoft.com/office/powerpoint/2015/main" val="1"/>
+              </p:ext>
+            </p:extLst>
+          </p:nvPr>
+        </p:nvSpPr>
+        <p:spPr>
+          <a:xfrm>
+            <a:off x="0" y="0"/>
+            <a:ext cx="12192000" cy="6858000"/>
+          </a:xfrm>
+          <a:prstGeom prst="rect">
+            <a:avLst/>
+          </a:prstGeom>
+          <a:ln>
+            <a:noFill/>
+          </a:ln>
+        </p:spPr>
+        <p:style>
+          <a:lnRef idx="2">
+            <a:schemeClr val="accent1">
+              <a:shade val="50000"/>
+            </a:schemeClr>
+          </a:lnRef>
+          <a:fillRef idx="1">
+            <a:schemeClr val="accent1"/>
+          </a:fillRef>
+          <a:effectRef idx="0">
+            <a:schemeClr val="accent1"/>
+          </a:effectRef>
+          <a:fontRef idx="minor">
+            <a:schemeClr val="lt1"/>
+          </a:fontRef>
+        </p:style>
+        <p:txBody>
+          <a:bodyPr rtlCol="0" anchor="ctr"/>
+          <a:lstStyle/>
+          <a:p>
+            <a:pPr algn="ctr"/>
+            <a:endParaRPr lang="en-US"/>
+          </a:p>
+        </p:txBody>
+      </p:sp>
+      <p:sp>
+        <p:nvSpPr>
+          <p:cNvPr id="12" name="Snip Diagonal Corner Rectangle 24">
+            <a:extLst>
+              <a:ext uri="{FF2B5EF4-FFF2-40B4-BE49-F238E27FC236}">
+                <a16:creationId xmlns:a16="http://schemas.microsoft.com/office/drawing/2014/main" id="{A2829537-8D6E-4F27-8454-8F19BEA8C11F}"/>
+              </a:ext>
+              <a:ext uri="{C183D7F6-B498-43B3-948B-1728B52AA6E4}">
+                <adec:decorative xmlns:adec="http://schemas.microsoft.com/office/drawing/2017/decorative" val="1"/>
+              </a:ext>
+            </a:extLst>
+          </p:cNvPr>
+          <p:cNvSpPr>
+            <a:spLocks noGrp="1" noRot="1" noChangeAspect="1" noMove="1" noResize="1" noEditPoints="1" noAdjustHandles="1" noChangeArrowheads="1" noChangeShapeType="1" noTextEdit="1"/>
+          </p:cNvSpPr>
+          <p:nvPr>
+            <p:extLst>
+              <p:ext uri="{386F3935-93C4-4BCD-93E2-E3B085C9AB24}">
+                <p16:designElem xmlns:p16="http://schemas.microsoft.com/office/powerpoint/2015/main" val="1"/>
+              </p:ext>
+            </p:extLst>
+          </p:nvPr>
+        </p:nvSpPr>
+        <p:spPr>
+          <a:xfrm>
+            <a:off x="628229" y="620722"/>
+            <a:ext cx="10935543" cy="5286838"/>
+          </a:xfrm>
+          <a:prstGeom prst="snip2DiagRect">
+            <a:avLst>
+              <a:gd name="adj1" fmla="val 10787"/>
+              <a:gd name="adj2" fmla="val 0"/>
+            </a:avLst>
+          </a:prstGeom>
+          <a:solidFill>
+            <a:schemeClr val="tx1"/>
+          </a:solidFill>
+          <a:ln>
+            <a:noFill/>
+          </a:ln>
+          <a:effectLst>
+            <a:innerShdw blurRad="57150" dist="38100" dir="14460000">
+              <a:prstClr val="black">
+                <a:alpha val="70000"/>
+              </a:prstClr>
+            </a:innerShdw>
+          </a:effectLst>
+        </p:spPr>
+        <p:style>
+          <a:lnRef idx="2">
+            <a:schemeClr val="accent1">
+              <a:shade val="50000"/>
+            </a:schemeClr>
+          </a:lnRef>
+          <a:fillRef idx="1">
+            <a:schemeClr val="accent1"/>
+          </a:fillRef>
+          <a:effectRef idx="0">
+            <a:schemeClr val="accent1"/>
+          </a:effectRef>
+          <a:fontRef idx="minor">
+            <a:schemeClr val="lt1"/>
+          </a:fontRef>
+        </p:style>
+        <p:txBody>
+          <a:bodyPr rtlCol="0" anchor="ctr"/>
+          <a:lstStyle/>
+          <a:p>
+            <a:pPr algn="ctr"/>
+            <a:endParaRPr lang="en-US"/>
+          </a:p>
+        </p:txBody>
+      </p:sp>
+      <p:pic>
+        <p:nvPicPr>
+          <p:cNvPr id="2" name="Slika 1" descr="Slika, ki vsebuje besede besedilo, diagram, vezje, posnetek zaslona&#10;&#10;Opis je samodejno ustvarjen">
+            <a:extLst>
+              <a:ext uri="{FF2B5EF4-FFF2-40B4-BE49-F238E27FC236}">
+                <a16:creationId xmlns:a16="http://schemas.microsoft.com/office/drawing/2014/main" id="{0299549C-B965-505F-4A4F-7D0631A61D61}"/>
+              </a:ext>
+            </a:extLst>
+          </p:cNvPr>
+          <p:cNvPicPr>
+            <a:picLocks noChangeAspect="1"/>
+          </p:cNvPicPr>
+          <p:nvPr/>
+        </p:nvPicPr>
+        <p:blipFill rotWithShape="1">
+          <a:blip r:embed="rId2">
+            <a:extLst>
+              <a:ext uri="{28A0092B-C50C-407E-A947-70E740481C1C}">
+                <a14:useLocalDpi xmlns:a14="http://schemas.microsoft.com/office/drawing/2010/main" val="0"/>
+              </a:ext>
+            </a:extLst>
+          </a:blip>
+          <a:srcRect t="587" r="2" b="2"/>
+          <a:stretch/>
+        </p:blipFill>
+        <p:spPr>
+          <a:xfrm>
+            <a:off x="792480" y="786117"/>
+            <a:ext cx="10607040" cy="4956048"/>
+          </a:xfrm>
+          <a:custGeom>
+            <a:avLst/>
+            <a:gdLst/>
+            <a:ahLst/>
+            <a:cxnLst/>
+            <a:rect l="l" t="t" r="r" b="b"/>
+            <a:pathLst>
+              <a:path w="10607040" h="4956048">
+                <a:moveTo>
+                  <a:pt x="497480" y="0"/>
+                </a:moveTo>
+                <a:lnTo>
+                  <a:pt x="10607040" y="0"/>
+                </a:lnTo>
+                <a:lnTo>
+                  <a:pt x="10607040" y="4485407"/>
+                </a:lnTo>
+                <a:lnTo>
+                  <a:pt x="10131692" y="4956048"/>
+                </a:lnTo>
+                <a:lnTo>
+                  <a:pt x="0" y="4956048"/>
+                </a:lnTo>
+                <a:lnTo>
+                  <a:pt x="0" y="492554"/>
+                </a:lnTo>
+                <a:close/>
+              </a:path>
+            </a:pathLst>
+          </a:custGeom>
+        </p:spPr>
+      </p:pic>
+    </p:spTree>
+    <p:extLst>
+      <p:ext uri="{BB962C8B-B14F-4D97-AF65-F5344CB8AC3E}">
+        <p14:creationId xmlns:p14="http://schemas.microsoft.com/office/powerpoint/2010/main" val="4187719309"/>
+      </p:ext>
+    </p:extLst>
+  </p:cSld>
+  <p:clrMapOvr>
+    <a:masterClrMapping/>
+  </p:clrMapOvr>
+</p:sld>
+</file>
+
+<file path=ppt/slides/slide5.xml><?xml version="1.0" encoding="utf-8"?>
+<p:sld xmlns:a="http://schemas.openxmlformats.org/drawingml/2006/main" xmlns:r="http://schemas.openxmlformats.org/officeDocument/2006/relationships" xmlns:p="http://schemas.openxmlformats.org/presentationml/2006/main">
+  <p:cSld>
+    <p:spTree>
+      <p:nvGrpSpPr>
+        <p:cNvPr id="1" name=""/>
+        <p:cNvGrpSpPr/>
+        <p:nvPr/>
+      </p:nvGrpSpPr>
+      <p:grpSpPr>
+        <a:xfrm>
+          <a:off x="0" y="0"/>
+          <a:ext cx="0" cy="0"/>
+          <a:chOff x="0" y="0"/>
+          <a:chExt cx="0" cy="0"/>
+        </a:xfrm>
+      </p:grpSpPr>
+      <p:sp>
+        <p:nvSpPr>
+          <p:cNvPr id="3" name="Označba mesta besedila 2">
+            <a:extLst>
+              <a:ext uri="{FF2B5EF4-FFF2-40B4-BE49-F238E27FC236}">
+                <a16:creationId xmlns:a16="http://schemas.microsoft.com/office/drawing/2014/main" id="{6BD1E339-FCBB-46AE-3656-406315600E4E}"/>
+              </a:ext>
+            </a:extLst>
+          </p:cNvPr>
+          <p:cNvSpPr>
+            <a:spLocks noGrp="1"/>
+          </p:cNvSpPr>
+          <p:nvPr>
+            <p:ph type="body" idx="1"/>
+          </p:nvPr>
+        </p:nvSpPr>
+        <p:spPr>
+          <a:xfrm>
+            <a:off x="3539216" y="2489200"/>
+            <a:ext cx="5113568" cy="1879600"/>
+          </a:xfrm>
+        </p:spPr>
+        <p:txBody>
+          <a:bodyPr/>
+          <a:lstStyle/>
+          <a:p>
+            <a:r>
+              <a:rPr lang="en-GB" dirty="0" err="1">
+                <a:solidFill>
+                  <a:schemeClr val="tx1"/>
+                </a:solidFill>
+              </a:rPr>
+              <a:t>Povezavi</a:t>
+            </a:r>
+            <a:r>
+              <a:rPr lang="en-GB" dirty="0">
+                <a:solidFill>
+                  <a:schemeClr val="tx1"/>
+                </a:solidFill>
+              </a:rPr>
+              <a:t> do </a:t>
+            </a:r>
+            <a:r>
+              <a:rPr lang="en-GB" dirty="0" err="1">
+                <a:solidFill>
+                  <a:schemeClr val="tx1"/>
+                </a:solidFill>
+              </a:rPr>
+              <a:t>spletne</a:t>
+            </a:r>
+            <a:r>
+              <a:rPr lang="en-GB" dirty="0">
+                <a:solidFill>
+                  <a:schemeClr val="tx1"/>
+                </a:solidFill>
+              </a:rPr>
+              <a:t> </a:t>
+            </a:r>
+            <a:r>
+              <a:rPr lang="en-GB" dirty="0" err="1">
+                <a:solidFill>
+                  <a:schemeClr val="tx1"/>
+                </a:solidFill>
+              </a:rPr>
+              <a:t>strani</a:t>
+            </a:r>
+            <a:r>
+              <a:rPr lang="en-GB" dirty="0">
+                <a:solidFill>
+                  <a:schemeClr val="tx1"/>
+                </a:solidFill>
+              </a:rPr>
+              <a:t>:</a:t>
+            </a:r>
+          </a:p>
+          <a:p>
+            <a:r>
+              <a:rPr lang="sl-SI" dirty="0">
+                <a:solidFill>
+                  <a:schemeClr val="tx1">
+                    <a:lumMod val="85000"/>
+                  </a:schemeClr>
+                </a:solidFill>
+                <a:hlinkClick r:id="rId2">
+                  <a:extLst>
+                    <a:ext uri="{A12FA001-AC4F-418D-AE19-62706E023703}">
+                      <ahyp:hlinkClr xmlns:ahyp="http://schemas.microsoft.com/office/drawing/2018/hyperlinkcolor" val="tx"/>
+                    </a:ext>
+                  </a:extLst>
+                </a:hlinkClick>
+              </a:rPr>
+              <a:t>https://bimodoo.000webhostapp.com/</a:t>
+            </a:r>
+            <a:r>
+              <a:rPr lang="en-GB" dirty="0">
+                <a:solidFill>
+                  <a:schemeClr val="tx1">
+                    <a:lumMod val="85000"/>
+                  </a:schemeClr>
+                </a:solidFill>
+              </a:rPr>
+              <a:t> </a:t>
+            </a:r>
+          </a:p>
+          <a:p>
+            <a:r>
+              <a:rPr lang="sl-SI" dirty="0">
+                <a:solidFill>
+                  <a:schemeClr val="tx1">
+                    <a:lumMod val="85000"/>
+                  </a:schemeClr>
+                </a:solidFill>
+                <a:hlinkClick r:id="rId3">
+                  <a:extLst>
+                    <a:ext uri="{A12FA001-AC4F-418D-AE19-62706E023703}">
+                      <ahyp:hlinkClr xmlns:ahyp="http://schemas.microsoft.com/office/drawing/2018/hyperlinkcolor" val="tx"/>
+                    </a:ext>
+                  </a:extLst>
+                </a:hlinkClick>
+              </a:rPr>
+              <a:t>http://mirkodev.me/</a:t>
+            </a:r>
+            <a:r>
+              <a:rPr lang="en-GB" dirty="0">
+                <a:solidFill>
+                  <a:schemeClr val="tx1">
+                    <a:lumMod val="85000"/>
+                  </a:schemeClr>
+                </a:solidFill>
+              </a:rPr>
+              <a:t> </a:t>
+            </a:r>
+            <a:endParaRPr lang="sl-SI" dirty="0">
+              <a:solidFill>
+                <a:schemeClr val="tx1">
+                  <a:lumMod val="85000"/>
+                </a:schemeClr>
+              </a:solidFill>
+            </a:endParaRPr>
+          </a:p>
+        </p:txBody>
+      </p:sp>
+    </p:spTree>
+    <p:extLst>
+      <p:ext uri="{BB962C8B-B14F-4D97-AF65-F5344CB8AC3E}">
+        <p14:creationId xmlns:p14="http://schemas.microsoft.com/office/powerpoint/2010/main" val="428146513"/>
       </p:ext>
     </p:extLst>
   </p:cSld>

</xml_diff>